<commit_message>
Added page nums and refs
</commit_message>
<xml_diff>
--- a/code-style.pptx
+++ b/code-style.pptx
@@ -1,9 +1,12 @@
 
 <file path=ppt/presentation.xml><?xml version="1.0" encoding="utf-8"?>
-<p:presentation xmlns:a="http://schemas.openxmlformats.org/drawingml/2006/main" xmlns:r="http://schemas.openxmlformats.org/officeDocument/2006/relationships" xmlns:p="http://schemas.openxmlformats.org/presentationml/2006/main" saveSubsetFonts="1" autoCompressPictures="0">
+<p:presentation xmlns:a="http://schemas.openxmlformats.org/drawingml/2006/main" xmlns:r="http://schemas.openxmlformats.org/officeDocument/2006/relationships" xmlns:p="http://schemas.openxmlformats.org/presentationml/2006/main" firstSlideNum="0" showSpecialPlsOnTitleSld="0" saveSubsetFonts="1" autoCompressPictures="0">
   <p:sldMasterIdLst>
     <p:sldMasterId id="2147483648" r:id="rId1"/>
   </p:sldMasterIdLst>
+  <p:notesMasterIdLst>
+    <p:notesMasterId r:id="rId14"/>
+  </p:notesMasterIdLst>
   <p:sldIdLst>
     <p:sldId id="256" r:id="rId2"/>
     <p:sldId id="258" r:id="rId3"/>
@@ -16,6 +19,7 @@
     <p:sldId id="261" r:id="rId10"/>
     <p:sldId id="264" r:id="rId11"/>
     <p:sldId id="270" r:id="rId12"/>
+    <p:sldId id="273" r:id="rId13"/>
   </p:sldIdLst>
   <p:sldSz cx="12192000" cy="6858000"/>
   <p:notesSz cx="6858000" cy="9144000"/>
@@ -114,7 +118,362 @@
       </a:defRPr>
     </a:lvl9pPr>
   </p:defaultTextStyle>
+  <p:extLst>
+    <p:ext uri="{EFAFB233-063F-42B5-8137-9DF3F51BA10A}">
+      <p15:sldGuideLst xmlns:p15="http://schemas.microsoft.com/office/powerpoint/2012/main"/>
+    </p:ext>
+  </p:extLst>
 </p:presentation>
+</file>
+
+<file path=ppt/notesMasters/notesMaster1.xml><?xml version="1.0" encoding="utf-8"?>
+<p:notesMaster xmlns:a="http://schemas.openxmlformats.org/drawingml/2006/main" xmlns:r="http://schemas.openxmlformats.org/officeDocument/2006/relationships" xmlns:p="http://schemas.openxmlformats.org/presentationml/2006/main">
+  <p:cSld>
+    <p:bg>
+      <p:bgRef idx="1001">
+        <a:schemeClr val="bg1"/>
+      </p:bgRef>
+    </p:bg>
+    <p:spTree>
+      <p:nvGrpSpPr>
+        <p:cNvPr id="1" name=""/>
+        <p:cNvGrpSpPr/>
+        <p:nvPr/>
+      </p:nvGrpSpPr>
+      <p:grpSpPr>
+        <a:xfrm>
+          <a:off x="0" y="0"/>
+          <a:ext cx="0" cy="0"/>
+          <a:chOff x="0" y="0"/>
+          <a:chExt cx="0" cy="0"/>
+        </a:xfrm>
+      </p:grpSpPr>
+      <p:sp>
+        <p:nvSpPr>
+          <p:cNvPr id="2" name="Header Placeholder 1"/>
+          <p:cNvSpPr>
+            <a:spLocks noGrp="1"/>
+          </p:cNvSpPr>
+          <p:nvPr>
+            <p:ph type="hdr" sz="quarter"/>
+          </p:nvPr>
+        </p:nvSpPr>
+        <p:spPr>
+          <a:xfrm>
+            <a:off x="0" y="0"/>
+            <a:ext cx="2971800" cy="458788"/>
+          </a:xfrm>
+          <a:prstGeom prst="rect">
+            <a:avLst/>
+          </a:prstGeom>
+        </p:spPr>
+        <p:txBody>
+          <a:bodyPr vert="horz" lIns="91440" tIns="45720" rIns="91440" bIns="45720" rtlCol="0"/>
+          <a:lstStyle>
+            <a:lvl1pPr algn="l">
+              <a:defRPr sz="1200"/>
+            </a:lvl1pPr>
+          </a:lstStyle>
+          <a:p>
+            <a:endParaRPr lang="en-US"/>
+          </a:p>
+        </p:txBody>
+      </p:sp>
+      <p:sp>
+        <p:nvSpPr>
+          <p:cNvPr id="3" name="Date Placeholder 2"/>
+          <p:cNvSpPr>
+            <a:spLocks noGrp="1"/>
+          </p:cNvSpPr>
+          <p:nvPr>
+            <p:ph type="dt" idx="1"/>
+          </p:nvPr>
+        </p:nvSpPr>
+        <p:spPr>
+          <a:xfrm>
+            <a:off x="3884613" y="0"/>
+            <a:ext cx="2971800" cy="458788"/>
+          </a:xfrm>
+          <a:prstGeom prst="rect">
+            <a:avLst/>
+          </a:prstGeom>
+        </p:spPr>
+        <p:txBody>
+          <a:bodyPr vert="horz" lIns="91440" tIns="45720" rIns="91440" bIns="45720" rtlCol="0"/>
+          <a:lstStyle>
+            <a:lvl1pPr algn="r">
+              <a:defRPr sz="1200"/>
+            </a:lvl1pPr>
+          </a:lstStyle>
+          <a:p>
+            <a:fld id="{FD5672A7-429C-7442-BF31-FD4C36942CD1}" type="datetimeFigureOut">
+              <a:rPr lang="en-US" smtClean="0"/>
+              <a:t>9/29/25</a:t>
+            </a:fld>
+            <a:endParaRPr lang="en-US"/>
+          </a:p>
+        </p:txBody>
+      </p:sp>
+      <p:sp>
+        <p:nvSpPr>
+          <p:cNvPr id="4" name="Slide Image Placeholder 3"/>
+          <p:cNvSpPr>
+            <a:spLocks noGrp="1" noRot="1" noChangeAspect="1"/>
+          </p:cNvSpPr>
+          <p:nvPr>
+            <p:ph type="sldImg" idx="2"/>
+          </p:nvPr>
+        </p:nvSpPr>
+        <p:spPr>
+          <a:xfrm>
+            <a:off x="685800" y="1143000"/>
+            <a:ext cx="5486400" cy="3086100"/>
+          </a:xfrm>
+          <a:prstGeom prst="rect">
+            <a:avLst/>
+          </a:prstGeom>
+          <a:noFill/>
+          <a:ln w="12700">
+            <a:solidFill>
+              <a:prstClr val="black"/>
+            </a:solidFill>
+          </a:ln>
+        </p:spPr>
+        <p:txBody>
+          <a:bodyPr vert="horz" lIns="91440" tIns="45720" rIns="91440" bIns="45720" rtlCol="0" anchor="ctr"/>
+          <a:lstStyle/>
+          <a:p>
+            <a:endParaRPr lang="en-US"/>
+          </a:p>
+        </p:txBody>
+      </p:sp>
+      <p:sp>
+        <p:nvSpPr>
+          <p:cNvPr id="5" name="Notes Placeholder 4"/>
+          <p:cNvSpPr>
+            <a:spLocks noGrp="1"/>
+          </p:cNvSpPr>
+          <p:nvPr>
+            <p:ph type="body" sz="quarter" idx="3"/>
+          </p:nvPr>
+        </p:nvSpPr>
+        <p:spPr>
+          <a:xfrm>
+            <a:off x="685800" y="4400550"/>
+            <a:ext cx="5486400" cy="3600450"/>
+          </a:xfrm>
+          <a:prstGeom prst="rect">
+            <a:avLst/>
+          </a:prstGeom>
+        </p:spPr>
+        <p:txBody>
+          <a:bodyPr vert="horz" lIns="91440" tIns="45720" rIns="91440" bIns="45720" rtlCol="0"/>
+          <a:lstStyle/>
+          <a:p>
+            <a:pPr lvl="0"/>
+            <a:r>
+              <a:rPr lang="en-GB"/>
+              <a:t>Click to edit Master text styles</a:t>
+            </a:r>
+          </a:p>
+          <a:p>
+            <a:pPr lvl="1"/>
+            <a:r>
+              <a:rPr lang="en-GB"/>
+              <a:t>Second level</a:t>
+            </a:r>
+          </a:p>
+          <a:p>
+            <a:pPr lvl="2"/>
+            <a:r>
+              <a:rPr lang="en-GB"/>
+              <a:t>Third level</a:t>
+            </a:r>
+          </a:p>
+          <a:p>
+            <a:pPr lvl="3"/>
+            <a:r>
+              <a:rPr lang="en-GB"/>
+              <a:t>Fourth level</a:t>
+            </a:r>
+          </a:p>
+          <a:p>
+            <a:pPr lvl="4"/>
+            <a:r>
+              <a:rPr lang="en-GB"/>
+              <a:t>Fifth level</a:t>
+            </a:r>
+            <a:endParaRPr lang="en-US"/>
+          </a:p>
+        </p:txBody>
+      </p:sp>
+      <p:sp>
+        <p:nvSpPr>
+          <p:cNvPr id="6" name="Footer Placeholder 5"/>
+          <p:cNvSpPr>
+            <a:spLocks noGrp="1"/>
+          </p:cNvSpPr>
+          <p:nvPr>
+            <p:ph type="ftr" sz="quarter" idx="4"/>
+          </p:nvPr>
+        </p:nvSpPr>
+        <p:spPr>
+          <a:xfrm>
+            <a:off x="0" y="8685213"/>
+            <a:ext cx="2971800" cy="458787"/>
+          </a:xfrm>
+          <a:prstGeom prst="rect">
+            <a:avLst/>
+          </a:prstGeom>
+        </p:spPr>
+        <p:txBody>
+          <a:bodyPr vert="horz" lIns="91440" tIns="45720" rIns="91440" bIns="45720" rtlCol="0" anchor="b"/>
+          <a:lstStyle>
+            <a:lvl1pPr algn="l">
+              <a:defRPr sz="1200"/>
+            </a:lvl1pPr>
+          </a:lstStyle>
+          <a:p>
+            <a:endParaRPr lang="en-US"/>
+          </a:p>
+        </p:txBody>
+      </p:sp>
+      <p:sp>
+        <p:nvSpPr>
+          <p:cNvPr id="7" name="Slide Number Placeholder 6"/>
+          <p:cNvSpPr>
+            <a:spLocks noGrp="1"/>
+          </p:cNvSpPr>
+          <p:nvPr>
+            <p:ph type="sldNum" sz="quarter" idx="5"/>
+          </p:nvPr>
+        </p:nvSpPr>
+        <p:spPr>
+          <a:xfrm>
+            <a:off x="3884613" y="8685213"/>
+            <a:ext cx="2971800" cy="458787"/>
+          </a:xfrm>
+          <a:prstGeom prst="rect">
+            <a:avLst/>
+          </a:prstGeom>
+        </p:spPr>
+        <p:txBody>
+          <a:bodyPr vert="horz" lIns="91440" tIns="45720" rIns="91440" bIns="45720" rtlCol="0" anchor="b"/>
+          <a:lstStyle>
+            <a:lvl1pPr algn="r">
+              <a:defRPr sz="1200"/>
+            </a:lvl1pPr>
+          </a:lstStyle>
+          <a:p>
+            <a:fld id="{BA976BAA-25E1-4042-8A00-173D8F105CBD}" type="slidenum">
+              <a:rPr lang="en-US" smtClean="0"/>
+              <a:t>‹#›</a:t>
+            </a:fld>
+            <a:endParaRPr lang="en-US"/>
+          </a:p>
+        </p:txBody>
+      </p:sp>
+    </p:spTree>
+    <p:extLst>
+      <p:ext uri="{BB962C8B-B14F-4D97-AF65-F5344CB8AC3E}">
+        <p14:creationId xmlns:p14="http://schemas.microsoft.com/office/powerpoint/2010/main" val="1077146296"/>
+      </p:ext>
+    </p:extLst>
+  </p:cSld>
+  <p:clrMap bg1="lt1" tx1="dk1" bg2="lt2" tx2="dk2" accent1="accent1" accent2="accent2" accent3="accent3" accent4="accent4" accent5="accent5" accent6="accent6" hlink="hlink" folHlink="folHlink"/>
+  <p:notesStyle>
+    <a:lvl1pPr marL="0" algn="l" defTabSz="914400" rtl="0" eaLnBrk="1" latinLnBrk="0" hangingPunct="1">
+      <a:defRPr sz="1200" kern="1200">
+        <a:solidFill>
+          <a:schemeClr val="tx1"/>
+        </a:solidFill>
+        <a:latin typeface="+mn-lt"/>
+        <a:ea typeface="+mn-ea"/>
+        <a:cs typeface="+mn-cs"/>
+      </a:defRPr>
+    </a:lvl1pPr>
+    <a:lvl2pPr marL="457200" algn="l" defTabSz="914400" rtl="0" eaLnBrk="1" latinLnBrk="0" hangingPunct="1">
+      <a:defRPr sz="1200" kern="1200">
+        <a:solidFill>
+          <a:schemeClr val="tx1"/>
+        </a:solidFill>
+        <a:latin typeface="+mn-lt"/>
+        <a:ea typeface="+mn-ea"/>
+        <a:cs typeface="+mn-cs"/>
+      </a:defRPr>
+    </a:lvl2pPr>
+    <a:lvl3pPr marL="914400" algn="l" defTabSz="914400" rtl="0" eaLnBrk="1" latinLnBrk="0" hangingPunct="1">
+      <a:defRPr sz="1200" kern="1200">
+        <a:solidFill>
+          <a:schemeClr val="tx1"/>
+        </a:solidFill>
+        <a:latin typeface="+mn-lt"/>
+        <a:ea typeface="+mn-ea"/>
+        <a:cs typeface="+mn-cs"/>
+      </a:defRPr>
+    </a:lvl3pPr>
+    <a:lvl4pPr marL="1371600" algn="l" defTabSz="914400" rtl="0" eaLnBrk="1" latinLnBrk="0" hangingPunct="1">
+      <a:defRPr sz="1200" kern="1200">
+        <a:solidFill>
+          <a:schemeClr val="tx1"/>
+        </a:solidFill>
+        <a:latin typeface="+mn-lt"/>
+        <a:ea typeface="+mn-ea"/>
+        <a:cs typeface="+mn-cs"/>
+      </a:defRPr>
+    </a:lvl4pPr>
+    <a:lvl5pPr marL="1828800" algn="l" defTabSz="914400" rtl="0" eaLnBrk="1" latinLnBrk="0" hangingPunct="1">
+      <a:defRPr sz="1200" kern="1200">
+        <a:solidFill>
+          <a:schemeClr val="tx1"/>
+        </a:solidFill>
+        <a:latin typeface="+mn-lt"/>
+        <a:ea typeface="+mn-ea"/>
+        <a:cs typeface="+mn-cs"/>
+      </a:defRPr>
+    </a:lvl5pPr>
+    <a:lvl6pPr marL="2286000" algn="l" defTabSz="914400" rtl="0" eaLnBrk="1" latinLnBrk="0" hangingPunct="1">
+      <a:defRPr sz="1200" kern="1200">
+        <a:solidFill>
+          <a:schemeClr val="tx1"/>
+        </a:solidFill>
+        <a:latin typeface="+mn-lt"/>
+        <a:ea typeface="+mn-ea"/>
+        <a:cs typeface="+mn-cs"/>
+      </a:defRPr>
+    </a:lvl6pPr>
+    <a:lvl7pPr marL="2743200" algn="l" defTabSz="914400" rtl="0" eaLnBrk="1" latinLnBrk="0" hangingPunct="1">
+      <a:defRPr sz="1200" kern="1200">
+        <a:solidFill>
+          <a:schemeClr val="tx1"/>
+        </a:solidFill>
+        <a:latin typeface="+mn-lt"/>
+        <a:ea typeface="+mn-ea"/>
+        <a:cs typeface="+mn-cs"/>
+      </a:defRPr>
+    </a:lvl7pPr>
+    <a:lvl8pPr marL="3200400" algn="l" defTabSz="914400" rtl="0" eaLnBrk="1" latinLnBrk="0" hangingPunct="1">
+      <a:defRPr sz="1200" kern="1200">
+        <a:solidFill>
+          <a:schemeClr val="tx1"/>
+        </a:solidFill>
+        <a:latin typeface="+mn-lt"/>
+        <a:ea typeface="+mn-ea"/>
+        <a:cs typeface="+mn-cs"/>
+      </a:defRPr>
+    </a:lvl8pPr>
+    <a:lvl9pPr marL="3657600" algn="l" defTabSz="914400" rtl="0" eaLnBrk="1" latinLnBrk="0" hangingPunct="1">
+      <a:defRPr sz="1200" kern="1200">
+        <a:solidFill>
+          <a:schemeClr val="tx1"/>
+        </a:solidFill>
+        <a:latin typeface="+mn-lt"/>
+        <a:ea typeface="+mn-ea"/>
+        <a:cs typeface="+mn-cs"/>
+      </a:defRPr>
+    </a:lvl9pPr>
+  </p:notesStyle>
+</p:notesMaster>
 </file>
 
 <file path=ppt/slideLayouts/slideLayout1.xml><?xml version="1.0" encoding="utf-8"?>
@@ -264,9 +623,9 @@
           <a:bodyPr/>
           <a:lstStyle/>
           <a:p>
-            <a:fld id="{2A5667E1-6C6B-624C-805F-DF72CB43D63E}" type="datetimeFigureOut">
-              <a:rPr lang="en-US" smtClean="0"/>
-              <a:t>9/29/25</a:t>
+            <a:fld id="{BE0A8838-872D-EF4D-B359-0924F784B6EE}" type="datetime1">
+              <a:rPr lang="en-NZ" smtClean="0"/>
+              <a:t>29/09/25</a:t>
             </a:fld>
             <a:endParaRPr lang="en-US"/>
           </a:p>
@@ -464,9 +823,9 @@
           <a:bodyPr/>
           <a:lstStyle/>
           <a:p>
-            <a:fld id="{2A5667E1-6C6B-624C-805F-DF72CB43D63E}" type="datetimeFigureOut">
-              <a:rPr lang="en-US" smtClean="0"/>
-              <a:t>9/29/25</a:t>
+            <a:fld id="{A507A50E-37A9-E043-8A13-A7E2160BB2D9}" type="datetime1">
+              <a:rPr lang="en-NZ" smtClean="0"/>
+              <a:t>29/09/25</a:t>
             </a:fld>
             <a:endParaRPr lang="en-US"/>
           </a:p>
@@ -674,9 +1033,9 @@
           <a:bodyPr/>
           <a:lstStyle/>
           <a:p>
-            <a:fld id="{2A5667E1-6C6B-624C-805F-DF72CB43D63E}" type="datetimeFigureOut">
-              <a:rPr lang="en-US" smtClean="0"/>
-              <a:t>9/29/25</a:t>
+            <a:fld id="{208F07D6-7EC8-1E4E-8916-55F1ACA387C6}" type="datetime1">
+              <a:rPr lang="en-NZ" smtClean="0"/>
+              <a:t>29/09/25</a:t>
             </a:fld>
             <a:endParaRPr lang="en-US"/>
           </a:p>
@@ -874,9 +1233,9 @@
           <a:bodyPr/>
           <a:lstStyle/>
           <a:p>
-            <a:fld id="{2A5667E1-6C6B-624C-805F-DF72CB43D63E}" type="datetimeFigureOut">
-              <a:rPr lang="en-US" smtClean="0"/>
-              <a:t>9/29/25</a:t>
+            <a:fld id="{474789A0-337C-7E48-98C8-CBCAF28409D3}" type="datetime1">
+              <a:rPr lang="en-NZ" smtClean="0"/>
+              <a:t>29/09/25</a:t>
             </a:fld>
             <a:endParaRPr lang="en-US"/>
           </a:p>
@@ -1150,9 +1509,9 @@
           <a:bodyPr/>
           <a:lstStyle/>
           <a:p>
-            <a:fld id="{2A5667E1-6C6B-624C-805F-DF72CB43D63E}" type="datetimeFigureOut">
-              <a:rPr lang="en-US" smtClean="0"/>
-              <a:t>9/29/25</a:t>
+            <a:fld id="{0E405F7E-4D8F-BD4B-84B0-1E8DDC59936A}" type="datetime1">
+              <a:rPr lang="en-NZ" smtClean="0"/>
+              <a:t>29/09/25</a:t>
             </a:fld>
             <a:endParaRPr lang="en-US"/>
           </a:p>
@@ -1418,9 +1777,9 @@
           <a:bodyPr/>
           <a:lstStyle/>
           <a:p>
-            <a:fld id="{2A5667E1-6C6B-624C-805F-DF72CB43D63E}" type="datetimeFigureOut">
-              <a:rPr lang="en-US" smtClean="0"/>
-              <a:t>9/29/25</a:t>
+            <a:fld id="{C8A674B7-F792-8949-AF75-FB7F433AC605}" type="datetime1">
+              <a:rPr lang="en-NZ" smtClean="0"/>
+              <a:t>29/09/25</a:t>
             </a:fld>
             <a:endParaRPr lang="en-US"/>
           </a:p>
@@ -1833,9 +2192,9 @@
           <a:bodyPr/>
           <a:lstStyle/>
           <a:p>
-            <a:fld id="{2A5667E1-6C6B-624C-805F-DF72CB43D63E}" type="datetimeFigureOut">
-              <a:rPr lang="en-US" smtClean="0"/>
-              <a:t>9/29/25</a:t>
+            <a:fld id="{1D8587CB-A678-5F48-97DB-CEEFC5DA9B63}" type="datetime1">
+              <a:rPr lang="en-NZ" smtClean="0"/>
+              <a:t>29/09/25</a:t>
             </a:fld>
             <a:endParaRPr lang="en-US"/>
           </a:p>
@@ -1975,9 +2334,9 @@
           <a:bodyPr/>
           <a:lstStyle/>
           <a:p>
-            <a:fld id="{2A5667E1-6C6B-624C-805F-DF72CB43D63E}" type="datetimeFigureOut">
-              <a:rPr lang="en-US" smtClean="0"/>
-              <a:t>9/29/25</a:t>
+            <a:fld id="{EA69CF7D-78BB-2E46-A4BD-B09BCFCF66DA}" type="datetime1">
+              <a:rPr lang="en-NZ" smtClean="0"/>
+              <a:t>29/09/25</a:t>
             </a:fld>
             <a:endParaRPr lang="en-US"/>
           </a:p>
@@ -2088,9 +2447,9 @@
           <a:bodyPr/>
           <a:lstStyle/>
           <a:p>
-            <a:fld id="{2A5667E1-6C6B-624C-805F-DF72CB43D63E}" type="datetimeFigureOut">
-              <a:rPr lang="en-US" smtClean="0"/>
-              <a:t>9/29/25</a:t>
+            <a:fld id="{7D815268-786C-A746-87BD-D24B98ECD2A9}" type="datetime1">
+              <a:rPr lang="en-NZ" smtClean="0"/>
+              <a:t>29/09/25</a:t>
             </a:fld>
             <a:endParaRPr lang="en-US"/>
           </a:p>
@@ -2401,9 +2760,9 @@
           <a:bodyPr/>
           <a:lstStyle/>
           <a:p>
-            <a:fld id="{2A5667E1-6C6B-624C-805F-DF72CB43D63E}" type="datetimeFigureOut">
-              <a:rPr lang="en-US" smtClean="0"/>
-              <a:t>9/29/25</a:t>
+            <a:fld id="{AC7DA347-9667-984C-B702-6A557F389030}" type="datetime1">
+              <a:rPr lang="en-NZ" smtClean="0"/>
+              <a:t>29/09/25</a:t>
             </a:fld>
             <a:endParaRPr lang="en-US"/>
           </a:p>
@@ -2690,9 +3049,9 @@
           <a:bodyPr/>
           <a:lstStyle/>
           <a:p>
-            <a:fld id="{2A5667E1-6C6B-624C-805F-DF72CB43D63E}" type="datetimeFigureOut">
-              <a:rPr lang="en-US" smtClean="0"/>
-              <a:t>9/29/25</a:t>
+            <a:fld id="{AE3690E1-D273-8743-B745-1547A1774512}" type="datetime1">
+              <a:rPr lang="en-NZ" smtClean="0"/>
+              <a:t>29/09/25</a:t>
             </a:fld>
             <a:endParaRPr lang="en-US"/>
           </a:p>
@@ -2933,9 +3292,9 @@
             </a:lvl1pPr>
           </a:lstStyle>
           <a:p>
-            <a:fld id="{2A5667E1-6C6B-624C-805F-DF72CB43D63E}" type="datetimeFigureOut">
-              <a:rPr lang="en-US" smtClean="0"/>
-              <a:t>9/29/25</a:t>
+            <a:fld id="{E9F320B8-C8CC-1043-94DB-44636C049F5D}" type="datetime1">
+              <a:rPr lang="en-NZ" smtClean="0"/>
+              <a:t>29/09/25</a:t>
             </a:fld>
             <a:endParaRPr lang="en-US"/>
           </a:p>
@@ -3052,6 +3411,7 @@
     <p:sldLayoutId id="2147483658" r:id="rId10"/>
     <p:sldLayoutId id="2147483659" r:id="rId11"/>
   </p:sldLayoutIdLst>
+  <p:hf hdr="0" dt="0"/>
   <p:txStyles>
     <p:titleStyle>
       <a:lvl1pPr algn="l" defTabSz="914400" rtl="0" eaLnBrk="1" latinLnBrk="0" hangingPunct="1">
@@ -3576,6 +3936,60 @@
           </a:p>
         </p:txBody>
       </p:sp>
+      <p:sp>
+        <p:nvSpPr>
+          <p:cNvPr id="4" name="Footer Placeholder 3">
+            <a:extLst>
+              <a:ext uri="{FF2B5EF4-FFF2-40B4-BE49-F238E27FC236}">
+                <a16:creationId xmlns:a16="http://schemas.microsoft.com/office/drawing/2014/main" id="{6BD09D62-E919-7714-985C-347693ABCA55}"/>
+              </a:ext>
+            </a:extLst>
+          </p:cNvPr>
+          <p:cNvSpPr>
+            <a:spLocks noGrp="1"/>
+          </p:cNvSpPr>
+          <p:nvPr>
+            <p:ph type="ftr" sz="quarter" idx="11"/>
+          </p:nvPr>
+        </p:nvSpPr>
+        <p:spPr/>
+        <p:txBody>
+          <a:bodyPr/>
+          <a:lstStyle/>
+          <a:p>
+            <a:endParaRPr lang="en-US"/>
+          </a:p>
+        </p:txBody>
+      </p:sp>
+      <p:sp>
+        <p:nvSpPr>
+          <p:cNvPr id="5" name="Slide Number Placeholder 4">
+            <a:extLst>
+              <a:ext uri="{FF2B5EF4-FFF2-40B4-BE49-F238E27FC236}">
+                <a16:creationId xmlns:a16="http://schemas.microsoft.com/office/drawing/2014/main" id="{6758360F-9C98-8ED9-3B68-9358C82A002A}"/>
+              </a:ext>
+            </a:extLst>
+          </p:cNvPr>
+          <p:cNvSpPr>
+            <a:spLocks noGrp="1"/>
+          </p:cNvSpPr>
+          <p:nvPr>
+            <p:ph type="sldNum" sz="quarter" idx="12"/>
+          </p:nvPr>
+        </p:nvSpPr>
+        <p:spPr/>
+        <p:txBody>
+          <a:bodyPr/>
+          <a:lstStyle/>
+          <a:p>
+            <a:fld id="{DAB2AE97-AFB8-5E45-8C5F-47523E481DDB}" type="slidenum">
+              <a:rPr lang="en-US" smtClean="0"/>
+              <a:t>9</a:t>
+            </a:fld>
+            <a:endParaRPr lang="en-US"/>
+          </a:p>
+        </p:txBody>
+      </p:sp>
     </p:spTree>
     <p:extLst>
       <p:ext uri="{BB962C8B-B14F-4D97-AF65-F5344CB8AC3E}">
@@ -3642,10 +4056,223 @@
           </a:p>
         </p:txBody>
       </p:sp>
+      <p:sp>
+        <p:nvSpPr>
+          <p:cNvPr id="3" name="Footer Placeholder 2">
+            <a:extLst>
+              <a:ext uri="{FF2B5EF4-FFF2-40B4-BE49-F238E27FC236}">
+                <a16:creationId xmlns:a16="http://schemas.microsoft.com/office/drawing/2014/main" id="{FC26D752-DABF-91C8-CEA1-8D3D4086540E}"/>
+              </a:ext>
+            </a:extLst>
+          </p:cNvPr>
+          <p:cNvSpPr>
+            <a:spLocks noGrp="1"/>
+          </p:cNvSpPr>
+          <p:nvPr>
+            <p:ph type="ftr" sz="quarter" idx="11"/>
+          </p:nvPr>
+        </p:nvSpPr>
+        <p:spPr/>
+        <p:txBody>
+          <a:bodyPr/>
+          <a:lstStyle/>
+          <a:p>
+            <a:endParaRPr lang="en-US"/>
+          </a:p>
+        </p:txBody>
+      </p:sp>
+      <p:sp>
+        <p:nvSpPr>
+          <p:cNvPr id="4" name="Slide Number Placeholder 3">
+            <a:extLst>
+              <a:ext uri="{FF2B5EF4-FFF2-40B4-BE49-F238E27FC236}">
+                <a16:creationId xmlns:a16="http://schemas.microsoft.com/office/drawing/2014/main" id="{C0D55589-BB47-807C-61C5-1DA48E8A2BD9}"/>
+              </a:ext>
+            </a:extLst>
+          </p:cNvPr>
+          <p:cNvSpPr>
+            <a:spLocks noGrp="1"/>
+          </p:cNvSpPr>
+          <p:nvPr>
+            <p:ph type="sldNum" sz="quarter" idx="12"/>
+          </p:nvPr>
+        </p:nvSpPr>
+        <p:spPr/>
+        <p:txBody>
+          <a:bodyPr/>
+          <a:lstStyle/>
+          <a:p>
+            <a:fld id="{DAB2AE97-AFB8-5E45-8C5F-47523E481DDB}" type="slidenum">
+              <a:rPr lang="en-US" smtClean="0"/>
+              <a:t>10</a:t>
+            </a:fld>
+            <a:endParaRPr lang="en-US"/>
+          </a:p>
+        </p:txBody>
+      </p:sp>
     </p:spTree>
     <p:extLst>
       <p:ext uri="{BB962C8B-B14F-4D97-AF65-F5344CB8AC3E}">
         <p14:creationId xmlns:p14="http://schemas.microsoft.com/office/powerpoint/2010/main" val="1061753753"/>
+      </p:ext>
+    </p:extLst>
+  </p:cSld>
+  <p:clrMapOvr>
+    <a:masterClrMapping/>
+  </p:clrMapOvr>
+</p:sld>
+</file>
+
+<file path=ppt/slides/slide12.xml><?xml version="1.0" encoding="utf-8"?>
+<p:sld xmlns:a="http://schemas.openxmlformats.org/drawingml/2006/main" xmlns:r="http://schemas.openxmlformats.org/officeDocument/2006/relationships" xmlns:p="http://schemas.openxmlformats.org/presentationml/2006/main">
+  <p:cSld>
+    <p:spTree>
+      <p:nvGrpSpPr>
+        <p:cNvPr id="1" name=""/>
+        <p:cNvGrpSpPr/>
+        <p:nvPr/>
+      </p:nvGrpSpPr>
+      <p:grpSpPr>
+        <a:xfrm>
+          <a:off x="0" y="0"/>
+          <a:ext cx="0" cy="0"/>
+          <a:chOff x="0" y="0"/>
+          <a:chExt cx="0" cy="0"/>
+        </a:xfrm>
+      </p:grpSpPr>
+      <p:sp>
+        <p:nvSpPr>
+          <p:cNvPr id="2" name="Title 1">
+            <a:extLst>
+              <a:ext uri="{FF2B5EF4-FFF2-40B4-BE49-F238E27FC236}">
+                <a16:creationId xmlns:a16="http://schemas.microsoft.com/office/drawing/2014/main" id="{5101AA65-3916-E328-5A84-A9E086A005DA}"/>
+              </a:ext>
+            </a:extLst>
+          </p:cNvPr>
+          <p:cNvSpPr>
+            <a:spLocks noGrp="1"/>
+          </p:cNvSpPr>
+          <p:nvPr>
+            <p:ph type="title"/>
+          </p:nvPr>
+        </p:nvSpPr>
+        <p:spPr/>
+        <p:txBody>
+          <a:bodyPr/>
+          <a:lstStyle/>
+          <a:p>
+            <a:r>
+              <a:rPr lang="en-US" dirty="0"/>
+              <a:t>References</a:t>
+            </a:r>
+          </a:p>
+        </p:txBody>
+      </p:sp>
+      <p:sp>
+        <p:nvSpPr>
+          <p:cNvPr id="3" name="Content Placeholder 2">
+            <a:extLst>
+              <a:ext uri="{FF2B5EF4-FFF2-40B4-BE49-F238E27FC236}">
+                <a16:creationId xmlns:a16="http://schemas.microsoft.com/office/drawing/2014/main" id="{81265F93-44E8-C7C0-7DBF-F10564518881}"/>
+              </a:ext>
+            </a:extLst>
+          </p:cNvPr>
+          <p:cNvSpPr>
+            <a:spLocks noGrp="1"/>
+          </p:cNvSpPr>
+          <p:nvPr>
+            <p:ph idx="1"/>
+          </p:nvPr>
+        </p:nvSpPr>
+        <p:spPr/>
+        <p:txBody>
+          <a:bodyPr/>
+          <a:lstStyle/>
+          <a:p>
+            <a:r>
+              <a:rPr lang="en-US" dirty="0"/>
+              <a:t>Sources of links and images are on their respective slides</a:t>
+            </a:r>
+          </a:p>
+          <a:p>
+            <a:endParaRPr lang="en-US" dirty="0"/>
+          </a:p>
+          <a:p>
+            <a:r>
+              <a:rPr lang="en-US" dirty="0"/>
+              <a:t>The coding checklist is inspired from </a:t>
+            </a:r>
+            <a:r>
+              <a:rPr lang="en-NZ" dirty="0">
+                <a:hlinkClick r:id="rId2"/>
+              </a:rPr>
+              <a:t>https://github.com/andreimladin/java-code-review-checklist</a:t>
+            </a:r>
+            <a:endParaRPr lang="en-NZ" dirty="0"/>
+          </a:p>
+          <a:p>
+            <a:endParaRPr lang="en-US" dirty="0"/>
+          </a:p>
+        </p:txBody>
+      </p:sp>
+      <p:sp>
+        <p:nvSpPr>
+          <p:cNvPr id="4" name="Footer Placeholder 3">
+            <a:extLst>
+              <a:ext uri="{FF2B5EF4-FFF2-40B4-BE49-F238E27FC236}">
+                <a16:creationId xmlns:a16="http://schemas.microsoft.com/office/drawing/2014/main" id="{72928C18-9FD4-7519-8A5F-0A6B46E41C1E}"/>
+              </a:ext>
+            </a:extLst>
+          </p:cNvPr>
+          <p:cNvSpPr>
+            <a:spLocks noGrp="1"/>
+          </p:cNvSpPr>
+          <p:nvPr>
+            <p:ph type="ftr" sz="quarter" idx="11"/>
+          </p:nvPr>
+        </p:nvSpPr>
+        <p:spPr/>
+        <p:txBody>
+          <a:bodyPr/>
+          <a:lstStyle/>
+          <a:p>
+            <a:endParaRPr lang="en-US"/>
+          </a:p>
+        </p:txBody>
+      </p:sp>
+      <p:sp>
+        <p:nvSpPr>
+          <p:cNvPr id="5" name="Slide Number Placeholder 4">
+            <a:extLst>
+              <a:ext uri="{FF2B5EF4-FFF2-40B4-BE49-F238E27FC236}">
+                <a16:creationId xmlns:a16="http://schemas.microsoft.com/office/drawing/2014/main" id="{96BCCE0D-626F-F16A-205D-7A33C25A48A6}"/>
+              </a:ext>
+            </a:extLst>
+          </p:cNvPr>
+          <p:cNvSpPr>
+            <a:spLocks noGrp="1"/>
+          </p:cNvSpPr>
+          <p:nvPr>
+            <p:ph type="sldNum" sz="quarter" idx="12"/>
+          </p:nvPr>
+        </p:nvSpPr>
+        <p:spPr/>
+        <p:txBody>
+          <a:bodyPr/>
+          <a:lstStyle/>
+          <a:p>
+            <a:fld id="{DAB2AE97-AFB8-5E45-8C5F-47523E481DDB}" type="slidenum">
+              <a:rPr lang="en-US" smtClean="0"/>
+              <a:t>11</a:t>
+            </a:fld>
+            <a:endParaRPr lang="en-US"/>
+          </a:p>
+        </p:txBody>
+      </p:sp>
+    </p:spTree>
+    <p:extLst>
+      <p:ext uri="{BB962C8B-B14F-4D97-AF65-F5344CB8AC3E}">
+        <p14:creationId xmlns:p14="http://schemas.microsoft.com/office/powerpoint/2010/main" val="2361802470"/>
       </p:ext>
     </p:extLst>
   </p:cSld>
@@ -3795,6 +4422,60 @@
               <a:t> </a:t>
             </a:r>
             <a:endParaRPr lang="en-NZ" dirty="0"/>
+          </a:p>
+        </p:txBody>
+      </p:sp>
+      <p:sp>
+        <p:nvSpPr>
+          <p:cNvPr id="4" name="Footer Placeholder 3">
+            <a:extLst>
+              <a:ext uri="{FF2B5EF4-FFF2-40B4-BE49-F238E27FC236}">
+                <a16:creationId xmlns:a16="http://schemas.microsoft.com/office/drawing/2014/main" id="{17F2D927-28B6-1BBD-04C0-CBF1E5B90634}"/>
+              </a:ext>
+            </a:extLst>
+          </p:cNvPr>
+          <p:cNvSpPr>
+            <a:spLocks noGrp="1"/>
+          </p:cNvSpPr>
+          <p:nvPr>
+            <p:ph type="ftr" sz="quarter" idx="11"/>
+          </p:nvPr>
+        </p:nvSpPr>
+        <p:spPr/>
+        <p:txBody>
+          <a:bodyPr/>
+          <a:lstStyle/>
+          <a:p>
+            <a:endParaRPr lang="en-US"/>
+          </a:p>
+        </p:txBody>
+      </p:sp>
+      <p:sp>
+        <p:nvSpPr>
+          <p:cNvPr id="5" name="Slide Number Placeholder 4">
+            <a:extLst>
+              <a:ext uri="{FF2B5EF4-FFF2-40B4-BE49-F238E27FC236}">
+                <a16:creationId xmlns:a16="http://schemas.microsoft.com/office/drawing/2014/main" id="{BB9C97D8-F771-18BA-0684-9A4D098E5492}"/>
+              </a:ext>
+            </a:extLst>
+          </p:cNvPr>
+          <p:cNvSpPr>
+            <a:spLocks noGrp="1"/>
+          </p:cNvSpPr>
+          <p:nvPr>
+            <p:ph type="sldNum" sz="quarter" idx="12"/>
+          </p:nvPr>
+        </p:nvSpPr>
+        <p:spPr/>
+        <p:txBody>
+          <a:bodyPr/>
+          <a:lstStyle/>
+          <a:p>
+            <a:fld id="{DAB2AE97-AFB8-5E45-8C5F-47523E481DDB}" type="slidenum">
+              <a:rPr lang="en-US" smtClean="0"/>
+              <a:t>1</a:t>
+            </a:fld>
+            <a:endParaRPr lang="en-US"/>
           </a:p>
         </p:txBody>
       </p:sp>
@@ -3947,6 +4628,60 @@
           </a:p>
         </p:txBody>
       </p:sp>
+      <p:sp>
+        <p:nvSpPr>
+          <p:cNvPr id="4" name="Footer Placeholder 3">
+            <a:extLst>
+              <a:ext uri="{FF2B5EF4-FFF2-40B4-BE49-F238E27FC236}">
+                <a16:creationId xmlns:a16="http://schemas.microsoft.com/office/drawing/2014/main" id="{C73B7035-6C31-D56B-1CB0-891EF01937DF}"/>
+              </a:ext>
+            </a:extLst>
+          </p:cNvPr>
+          <p:cNvSpPr>
+            <a:spLocks noGrp="1"/>
+          </p:cNvSpPr>
+          <p:nvPr>
+            <p:ph type="ftr" sz="quarter" idx="11"/>
+          </p:nvPr>
+        </p:nvSpPr>
+        <p:spPr/>
+        <p:txBody>
+          <a:bodyPr/>
+          <a:lstStyle/>
+          <a:p>
+            <a:endParaRPr lang="en-US"/>
+          </a:p>
+        </p:txBody>
+      </p:sp>
+      <p:sp>
+        <p:nvSpPr>
+          <p:cNvPr id="5" name="Slide Number Placeholder 4">
+            <a:extLst>
+              <a:ext uri="{FF2B5EF4-FFF2-40B4-BE49-F238E27FC236}">
+                <a16:creationId xmlns:a16="http://schemas.microsoft.com/office/drawing/2014/main" id="{D13DB708-EEEB-957C-5056-DD9D2304C66F}"/>
+              </a:ext>
+            </a:extLst>
+          </p:cNvPr>
+          <p:cNvSpPr>
+            <a:spLocks noGrp="1"/>
+          </p:cNvSpPr>
+          <p:nvPr>
+            <p:ph type="sldNum" sz="quarter" idx="12"/>
+          </p:nvPr>
+        </p:nvSpPr>
+        <p:spPr/>
+        <p:txBody>
+          <a:bodyPr/>
+          <a:lstStyle/>
+          <a:p>
+            <a:fld id="{DAB2AE97-AFB8-5E45-8C5F-47523E481DDB}" type="slidenum">
+              <a:rPr lang="en-US" smtClean="0"/>
+              <a:t>2</a:t>
+            </a:fld>
+            <a:endParaRPr lang="en-US"/>
+          </a:p>
+        </p:txBody>
+      </p:sp>
     </p:spTree>
     <p:extLst>
       <p:ext uri="{BB962C8B-B14F-4D97-AF65-F5344CB8AC3E}">
@@ -4181,6 +4916,60 @@
           </a:p>
         </p:txBody>
       </p:sp>
+      <p:sp>
+        <p:nvSpPr>
+          <p:cNvPr id="5" name="Footer Placeholder 4">
+            <a:extLst>
+              <a:ext uri="{FF2B5EF4-FFF2-40B4-BE49-F238E27FC236}">
+                <a16:creationId xmlns:a16="http://schemas.microsoft.com/office/drawing/2014/main" id="{2667D8DD-6B49-2A5A-9D66-AC189779C45B}"/>
+              </a:ext>
+            </a:extLst>
+          </p:cNvPr>
+          <p:cNvSpPr>
+            <a:spLocks noGrp="1"/>
+          </p:cNvSpPr>
+          <p:nvPr>
+            <p:ph type="ftr" sz="quarter" idx="11"/>
+          </p:nvPr>
+        </p:nvSpPr>
+        <p:spPr/>
+        <p:txBody>
+          <a:bodyPr/>
+          <a:lstStyle/>
+          <a:p>
+            <a:endParaRPr lang="en-US"/>
+          </a:p>
+        </p:txBody>
+      </p:sp>
+      <p:sp>
+        <p:nvSpPr>
+          <p:cNvPr id="6" name="Slide Number Placeholder 5">
+            <a:extLst>
+              <a:ext uri="{FF2B5EF4-FFF2-40B4-BE49-F238E27FC236}">
+                <a16:creationId xmlns:a16="http://schemas.microsoft.com/office/drawing/2014/main" id="{5DBEAAE9-DF0F-09CF-DEE9-240C0BCC8A4D}"/>
+              </a:ext>
+            </a:extLst>
+          </p:cNvPr>
+          <p:cNvSpPr>
+            <a:spLocks noGrp="1"/>
+          </p:cNvSpPr>
+          <p:nvPr>
+            <p:ph type="sldNum" sz="quarter" idx="12"/>
+          </p:nvPr>
+        </p:nvSpPr>
+        <p:spPr/>
+        <p:txBody>
+          <a:bodyPr/>
+          <a:lstStyle/>
+          <a:p>
+            <a:fld id="{DAB2AE97-AFB8-5E45-8C5F-47523E481DDB}" type="slidenum">
+              <a:rPr lang="en-US" smtClean="0"/>
+              <a:t>3</a:t>
+            </a:fld>
+            <a:endParaRPr lang="en-US"/>
+          </a:p>
+        </p:txBody>
+      </p:sp>
     </p:spTree>
     <p:extLst>
       <p:ext uri="{BB962C8B-B14F-4D97-AF65-F5344CB8AC3E}">
@@ -4330,6 +5119,60 @@
           </a:p>
         </p:txBody>
       </p:sp>
+      <p:sp>
+        <p:nvSpPr>
+          <p:cNvPr id="4" name="Footer Placeholder 3">
+            <a:extLst>
+              <a:ext uri="{FF2B5EF4-FFF2-40B4-BE49-F238E27FC236}">
+                <a16:creationId xmlns:a16="http://schemas.microsoft.com/office/drawing/2014/main" id="{5EE4574B-717C-C431-7E4D-842FCE8FA1D0}"/>
+              </a:ext>
+            </a:extLst>
+          </p:cNvPr>
+          <p:cNvSpPr>
+            <a:spLocks noGrp="1"/>
+          </p:cNvSpPr>
+          <p:nvPr>
+            <p:ph type="ftr" sz="quarter" idx="11"/>
+          </p:nvPr>
+        </p:nvSpPr>
+        <p:spPr/>
+        <p:txBody>
+          <a:bodyPr/>
+          <a:lstStyle/>
+          <a:p>
+            <a:endParaRPr lang="en-US"/>
+          </a:p>
+        </p:txBody>
+      </p:sp>
+      <p:sp>
+        <p:nvSpPr>
+          <p:cNvPr id="5" name="Slide Number Placeholder 4">
+            <a:extLst>
+              <a:ext uri="{FF2B5EF4-FFF2-40B4-BE49-F238E27FC236}">
+                <a16:creationId xmlns:a16="http://schemas.microsoft.com/office/drawing/2014/main" id="{7E688649-5D09-EB8A-A9DB-28FD97BF9895}"/>
+              </a:ext>
+            </a:extLst>
+          </p:cNvPr>
+          <p:cNvSpPr>
+            <a:spLocks noGrp="1"/>
+          </p:cNvSpPr>
+          <p:nvPr>
+            <p:ph type="sldNum" sz="quarter" idx="12"/>
+          </p:nvPr>
+        </p:nvSpPr>
+        <p:spPr/>
+        <p:txBody>
+          <a:bodyPr/>
+          <a:lstStyle/>
+          <a:p>
+            <a:fld id="{DAB2AE97-AFB8-5E45-8C5F-47523E481DDB}" type="slidenum">
+              <a:rPr lang="en-US" smtClean="0"/>
+              <a:t>4</a:t>
+            </a:fld>
+            <a:endParaRPr lang="en-US"/>
+          </a:p>
+        </p:txBody>
+      </p:sp>
     </p:spTree>
     <p:extLst>
       <p:ext uri="{BB962C8B-B14F-4D97-AF65-F5344CB8AC3E}">
@@ -4494,6 +5337,60 @@
           </a:p>
         </p:txBody>
       </p:sp>
+      <p:sp>
+        <p:nvSpPr>
+          <p:cNvPr id="4" name="Footer Placeholder 3">
+            <a:extLst>
+              <a:ext uri="{FF2B5EF4-FFF2-40B4-BE49-F238E27FC236}">
+                <a16:creationId xmlns:a16="http://schemas.microsoft.com/office/drawing/2014/main" id="{184ED946-C806-3A3C-3FB0-1437567D26CE}"/>
+              </a:ext>
+            </a:extLst>
+          </p:cNvPr>
+          <p:cNvSpPr>
+            <a:spLocks noGrp="1"/>
+          </p:cNvSpPr>
+          <p:nvPr>
+            <p:ph type="ftr" sz="quarter" idx="11"/>
+          </p:nvPr>
+        </p:nvSpPr>
+        <p:spPr/>
+        <p:txBody>
+          <a:bodyPr/>
+          <a:lstStyle/>
+          <a:p>
+            <a:endParaRPr lang="en-US"/>
+          </a:p>
+        </p:txBody>
+      </p:sp>
+      <p:sp>
+        <p:nvSpPr>
+          <p:cNvPr id="5" name="Slide Number Placeholder 4">
+            <a:extLst>
+              <a:ext uri="{FF2B5EF4-FFF2-40B4-BE49-F238E27FC236}">
+                <a16:creationId xmlns:a16="http://schemas.microsoft.com/office/drawing/2014/main" id="{8C0F36A2-0E00-C0AD-01C0-799B3E7448D2}"/>
+              </a:ext>
+            </a:extLst>
+          </p:cNvPr>
+          <p:cNvSpPr>
+            <a:spLocks noGrp="1"/>
+          </p:cNvSpPr>
+          <p:nvPr>
+            <p:ph type="sldNum" sz="quarter" idx="12"/>
+          </p:nvPr>
+        </p:nvSpPr>
+        <p:spPr/>
+        <p:txBody>
+          <a:bodyPr/>
+          <a:lstStyle/>
+          <a:p>
+            <a:fld id="{DAB2AE97-AFB8-5E45-8C5F-47523E481DDB}" type="slidenum">
+              <a:rPr lang="en-US" smtClean="0"/>
+              <a:t>5</a:t>
+            </a:fld>
+            <a:endParaRPr lang="en-US"/>
+          </a:p>
+        </p:txBody>
+      </p:sp>
     </p:spTree>
     <p:extLst>
       <p:ext uri="{BB962C8B-B14F-4D97-AF65-F5344CB8AC3E}">
@@ -4794,6 +5691,60 @@
           </a:p>
         </p:txBody>
       </p:sp>
+      <p:sp>
+        <p:nvSpPr>
+          <p:cNvPr id="5" name="Footer Placeholder 4">
+            <a:extLst>
+              <a:ext uri="{FF2B5EF4-FFF2-40B4-BE49-F238E27FC236}">
+                <a16:creationId xmlns:a16="http://schemas.microsoft.com/office/drawing/2014/main" id="{E0C297A0-3614-86E0-B407-F791809BA2E9}"/>
+              </a:ext>
+            </a:extLst>
+          </p:cNvPr>
+          <p:cNvSpPr>
+            <a:spLocks noGrp="1"/>
+          </p:cNvSpPr>
+          <p:nvPr>
+            <p:ph type="ftr" sz="quarter" idx="11"/>
+          </p:nvPr>
+        </p:nvSpPr>
+        <p:spPr/>
+        <p:txBody>
+          <a:bodyPr/>
+          <a:lstStyle/>
+          <a:p>
+            <a:endParaRPr lang="en-US"/>
+          </a:p>
+        </p:txBody>
+      </p:sp>
+      <p:sp>
+        <p:nvSpPr>
+          <p:cNvPr id="6" name="Slide Number Placeholder 5">
+            <a:extLst>
+              <a:ext uri="{FF2B5EF4-FFF2-40B4-BE49-F238E27FC236}">
+                <a16:creationId xmlns:a16="http://schemas.microsoft.com/office/drawing/2014/main" id="{BC1FFE25-6D79-77C6-6663-B0C5708841E0}"/>
+              </a:ext>
+            </a:extLst>
+          </p:cNvPr>
+          <p:cNvSpPr>
+            <a:spLocks noGrp="1"/>
+          </p:cNvSpPr>
+          <p:nvPr>
+            <p:ph type="sldNum" sz="quarter" idx="12"/>
+          </p:nvPr>
+        </p:nvSpPr>
+        <p:spPr/>
+        <p:txBody>
+          <a:bodyPr/>
+          <a:lstStyle/>
+          <a:p>
+            <a:fld id="{DAB2AE97-AFB8-5E45-8C5F-47523E481DDB}" type="slidenum">
+              <a:rPr lang="en-US" smtClean="0"/>
+              <a:t>6</a:t>
+            </a:fld>
+            <a:endParaRPr lang="en-US"/>
+          </a:p>
+        </p:txBody>
+      </p:sp>
     </p:spTree>
     <p:extLst>
       <p:ext uri="{BB962C8B-B14F-4D97-AF65-F5344CB8AC3E}">
@@ -4934,6 +5885,60 @@
           </a:p>
         </p:txBody>
       </p:sp>
+      <p:sp>
+        <p:nvSpPr>
+          <p:cNvPr id="4" name="Footer Placeholder 3">
+            <a:extLst>
+              <a:ext uri="{FF2B5EF4-FFF2-40B4-BE49-F238E27FC236}">
+                <a16:creationId xmlns:a16="http://schemas.microsoft.com/office/drawing/2014/main" id="{3B53D38E-63A6-A6C4-E06A-7C8B25706248}"/>
+              </a:ext>
+            </a:extLst>
+          </p:cNvPr>
+          <p:cNvSpPr>
+            <a:spLocks noGrp="1"/>
+          </p:cNvSpPr>
+          <p:nvPr>
+            <p:ph type="ftr" sz="quarter" idx="11"/>
+          </p:nvPr>
+        </p:nvSpPr>
+        <p:spPr/>
+        <p:txBody>
+          <a:bodyPr/>
+          <a:lstStyle/>
+          <a:p>
+            <a:endParaRPr lang="en-US"/>
+          </a:p>
+        </p:txBody>
+      </p:sp>
+      <p:sp>
+        <p:nvSpPr>
+          <p:cNvPr id="5" name="Slide Number Placeholder 4">
+            <a:extLst>
+              <a:ext uri="{FF2B5EF4-FFF2-40B4-BE49-F238E27FC236}">
+                <a16:creationId xmlns:a16="http://schemas.microsoft.com/office/drawing/2014/main" id="{330223D5-7A45-F59C-83A6-C7DE7F3583A1}"/>
+              </a:ext>
+            </a:extLst>
+          </p:cNvPr>
+          <p:cNvSpPr>
+            <a:spLocks noGrp="1"/>
+          </p:cNvSpPr>
+          <p:nvPr>
+            <p:ph type="sldNum" sz="quarter" idx="12"/>
+          </p:nvPr>
+        </p:nvSpPr>
+        <p:spPr/>
+        <p:txBody>
+          <a:bodyPr/>
+          <a:lstStyle/>
+          <a:p>
+            <a:fld id="{DAB2AE97-AFB8-5E45-8C5F-47523E481DDB}" type="slidenum">
+              <a:rPr lang="en-US" smtClean="0"/>
+              <a:t>7</a:t>
+            </a:fld>
+            <a:endParaRPr lang="en-US"/>
+          </a:p>
+        </p:txBody>
+      </p:sp>
     </p:spTree>
     <p:extLst>
       <p:ext uri="{BB962C8B-B14F-4D97-AF65-F5344CB8AC3E}">
@@ -5145,6 +6150,60 @@
               <a:rPr lang="en-US" dirty="0"/>
               <a:t>Is the function documented (comments)?</a:t>
             </a:r>
+          </a:p>
+        </p:txBody>
+      </p:sp>
+      <p:sp>
+        <p:nvSpPr>
+          <p:cNvPr id="4" name="Footer Placeholder 3">
+            <a:extLst>
+              <a:ext uri="{FF2B5EF4-FFF2-40B4-BE49-F238E27FC236}">
+                <a16:creationId xmlns:a16="http://schemas.microsoft.com/office/drawing/2014/main" id="{5C804C2E-3413-2CD3-BD6C-51081FA0B524}"/>
+              </a:ext>
+            </a:extLst>
+          </p:cNvPr>
+          <p:cNvSpPr>
+            <a:spLocks noGrp="1"/>
+          </p:cNvSpPr>
+          <p:nvPr>
+            <p:ph type="ftr" sz="quarter" idx="11"/>
+          </p:nvPr>
+        </p:nvSpPr>
+        <p:spPr/>
+        <p:txBody>
+          <a:bodyPr/>
+          <a:lstStyle/>
+          <a:p>
+            <a:endParaRPr lang="en-US"/>
+          </a:p>
+        </p:txBody>
+      </p:sp>
+      <p:sp>
+        <p:nvSpPr>
+          <p:cNvPr id="5" name="Slide Number Placeholder 4">
+            <a:extLst>
+              <a:ext uri="{FF2B5EF4-FFF2-40B4-BE49-F238E27FC236}">
+                <a16:creationId xmlns:a16="http://schemas.microsoft.com/office/drawing/2014/main" id="{0D9D9F0B-4016-14D9-2D01-10505C49CDC4}"/>
+              </a:ext>
+            </a:extLst>
+          </p:cNvPr>
+          <p:cNvSpPr>
+            <a:spLocks noGrp="1"/>
+          </p:cNvSpPr>
+          <p:nvPr>
+            <p:ph type="sldNum" sz="quarter" idx="12"/>
+          </p:nvPr>
+        </p:nvSpPr>
+        <p:spPr/>
+        <p:txBody>
+          <a:bodyPr/>
+          <a:lstStyle/>
+          <a:p>
+            <a:fld id="{DAB2AE97-AFB8-5E45-8C5F-47523E481DDB}" type="slidenum">
+              <a:rPr lang="en-US" smtClean="0"/>
+              <a:t>8</a:t>
+            </a:fld>
+            <a:endParaRPr lang="en-US"/>
           </a:p>
         </p:txBody>
       </p:sp>
@@ -5474,4 +6533,319 @@
     </a:ext>
   </a:extLst>
 </a:theme>
+</file>
+
+<file path=ppt/theme/theme2.xml><?xml version="1.0" encoding="utf-8"?>
+<a:theme xmlns:a="http://schemas.openxmlformats.org/drawingml/2006/main" name="Office Theme">
+  <a:themeElements>
+    <a:clrScheme name="Office">
+      <a:dk1>
+        <a:sysClr val="windowText" lastClr="000000"/>
+      </a:dk1>
+      <a:lt1>
+        <a:sysClr val="window" lastClr="FFFFFF"/>
+      </a:lt1>
+      <a:dk2>
+        <a:srgbClr val="0E2841"/>
+      </a:dk2>
+      <a:lt2>
+        <a:srgbClr val="E8E8E8"/>
+      </a:lt2>
+      <a:accent1>
+        <a:srgbClr val="156082"/>
+      </a:accent1>
+      <a:accent2>
+        <a:srgbClr val="E97132"/>
+      </a:accent2>
+      <a:accent3>
+        <a:srgbClr val="196B24"/>
+      </a:accent3>
+      <a:accent4>
+        <a:srgbClr val="0F9ED5"/>
+      </a:accent4>
+      <a:accent5>
+        <a:srgbClr val="A02B93"/>
+      </a:accent5>
+      <a:accent6>
+        <a:srgbClr val="4EA72E"/>
+      </a:accent6>
+      <a:hlink>
+        <a:srgbClr val="467886"/>
+      </a:hlink>
+      <a:folHlink>
+        <a:srgbClr val="96607D"/>
+      </a:folHlink>
+    </a:clrScheme>
+    <a:fontScheme name="Office">
+      <a:majorFont>
+        <a:latin typeface="Aptos Display" panose="02110004020202020204"/>
+        <a:ea typeface=""/>
+        <a:cs typeface=""/>
+        <a:font script="Jpan" typeface="游ゴシック Light"/>
+        <a:font script="Hang" typeface="맑은 고딕"/>
+        <a:font script="Hans" typeface="等线 Light"/>
+        <a:font script="Hant" typeface="新細明體"/>
+        <a:font script="Arab" typeface="Times New Roman"/>
+        <a:font script="Hebr" typeface="Times New Roman"/>
+        <a:font script="Thai" typeface="Angsana New"/>
+        <a:font script="Ethi" typeface="Nyala"/>
+        <a:font script="Beng" typeface="Vrinda"/>
+        <a:font script="Gujr" typeface="Shruti"/>
+        <a:font script="Khmr" typeface="MoolBoran"/>
+        <a:font script="Knda" typeface="Tunga"/>
+        <a:font script="Guru" typeface="Raavi"/>
+        <a:font script="Cans" typeface="Euphemia"/>
+        <a:font script="Cher" typeface="Plantagenet Cherokee"/>
+        <a:font script="Yiii" typeface="Microsoft Yi Baiti"/>
+        <a:font script="Tibt" typeface="Microsoft Himalaya"/>
+        <a:font script="Thaa" typeface="MV Boli"/>
+        <a:font script="Deva" typeface="Mangal"/>
+        <a:font script="Telu" typeface="Gautami"/>
+        <a:font script="Taml" typeface="Latha"/>
+        <a:font script="Syrc" typeface="Estrangelo Edessa"/>
+        <a:font script="Orya" typeface="Kalinga"/>
+        <a:font script="Mlym" typeface="Kartika"/>
+        <a:font script="Laoo" typeface="DokChampa"/>
+        <a:font script="Sinh" typeface="Iskoola Pota"/>
+        <a:font script="Mong" typeface="Mongolian Baiti"/>
+        <a:font script="Viet" typeface="Times New Roman"/>
+        <a:font script="Uigh" typeface="Microsoft Uighur"/>
+        <a:font script="Geor" typeface="Sylfaen"/>
+        <a:font script="Armn" typeface="Arial"/>
+        <a:font script="Bugi" typeface="Leelawadee UI"/>
+        <a:font script="Bopo" typeface="Microsoft JhengHei"/>
+        <a:font script="Java" typeface="Javanese Text"/>
+        <a:font script="Lisu" typeface="Segoe UI"/>
+        <a:font script="Mymr" typeface="Myanmar Text"/>
+        <a:font script="Nkoo" typeface="Ebrima"/>
+        <a:font script="Olck" typeface="Nirmala UI"/>
+        <a:font script="Osma" typeface="Ebrima"/>
+        <a:font script="Phag" typeface="Phagspa"/>
+        <a:font script="Syrn" typeface="Estrangelo Edessa"/>
+        <a:font script="Syrj" typeface="Estrangelo Edessa"/>
+        <a:font script="Syre" typeface="Estrangelo Edessa"/>
+        <a:font script="Sora" typeface="Nirmala UI"/>
+        <a:font script="Tale" typeface="Microsoft Tai Le"/>
+        <a:font script="Talu" typeface="Microsoft New Tai Lue"/>
+        <a:font script="Tfng" typeface="Ebrima"/>
+      </a:majorFont>
+      <a:minorFont>
+        <a:latin typeface="Aptos" panose="02110004020202020204"/>
+        <a:ea typeface=""/>
+        <a:cs typeface=""/>
+        <a:font script="Jpan" typeface="游ゴシック"/>
+        <a:font script="Hang" typeface="맑은 고딕"/>
+        <a:font script="Hans" typeface="等线"/>
+        <a:font script="Hant" typeface="新細明體"/>
+        <a:font script="Arab" typeface="Arial"/>
+        <a:font script="Hebr" typeface="Arial"/>
+        <a:font script="Thai" typeface="Cordia New"/>
+        <a:font script="Ethi" typeface="Nyala"/>
+        <a:font script="Beng" typeface="Vrinda"/>
+        <a:font script="Gujr" typeface="Shruti"/>
+        <a:font script="Khmr" typeface="DaunPenh"/>
+        <a:font script="Knda" typeface="Tunga"/>
+        <a:font script="Guru" typeface="Raavi"/>
+        <a:font script="Cans" typeface="Euphemia"/>
+        <a:font script="Cher" typeface="Plantagenet Cherokee"/>
+        <a:font script="Yiii" typeface="Microsoft Yi Baiti"/>
+        <a:font script="Tibt" typeface="Microsoft Himalaya"/>
+        <a:font script="Thaa" typeface="MV Boli"/>
+        <a:font script="Deva" typeface="Mangal"/>
+        <a:font script="Telu" typeface="Gautami"/>
+        <a:font script="Taml" typeface="Latha"/>
+        <a:font script="Syrc" typeface="Estrangelo Edessa"/>
+        <a:font script="Orya" typeface="Kalinga"/>
+        <a:font script="Mlym" typeface="Kartika"/>
+        <a:font script="Laoo" typeface="DokChampa"/>
+        <a:font script="Sinh" typeface="Iskoola Pota"/>
+        <a:font script="Mong" typeface="Mongolian Baiti"/>
+        <a:font script="Viet" typeface="Arial"/>
+        <a:font script="Uigh" typeface="Microsoft Uighur"/>
+        <a:font script="Geor" typeface="Sylfaen"/>
+        <a:font script="Armn" typeface="Arial"/>
+        <a:font script="Bugi" typeface="Leelawadee UI"/>
+        <a:font script="Bopo" typeface="Microsoft JhengHei"/>
+        <a:font script="Java" typeface="Javanese Text"/>
+        <a:font script="Lisu" typeface="Segoe UI"/>
+        <a:font script="Mymr" typeface="Myanmar Text"/>
+        <a:font script="Nkoo" typeface="Ebrima"/>
+        <a:font script="Olck" typeface="Nirmala UI"/>
+        <a:font script="Osma" typeface="Ebrima"/>
+        <a:font script="Phag" typeface="Phagspa"/>
+        <a:font script="Syrn" typeface="Estrangelo Edessa"/>
+        <a:font script="Syrj" typeface="Estrangelo Edessa"/>
+        <a:font script="Syre" typeface="Estrangelo Edessa"/>
+        <a:font script="Sora" typeface="Nirmala UI"/>
+        <a:font script="Tale" typeface="Microsoft Tai Le"/>
+        <a:font script="Talu" typeface="Microsoft New Tai Lue"/>
+        <a:font script="Tfng" typeface="Ebrima"/>
+      </a:minorFont>
+    </a:fontScheme>
+    <a:fmtScheme name="Office">
+      <a:fillStyleLst>
+        <a:solidFill>
+          <a:schemeClr val="phClr"/>
+        </a:solidFill>
+        <a:gradFill rotWithShape="1">
+          <a:gsLst>
+            <a:gs pos="0">
+              <a:schemeClr val="phClr">
+                <a:lumMod val="110000"/>
+                <a:satMod val="105000"/>
+                <a:tint val="67000"/>
+              </a:schemeClr>
+            </a:gs>
+            <a:gs pos="50000">
+              <a:schemeClr val="phClr">
+                <a:lumMod val="105000"/>
+                <a:satMod val="103000"/>
+                <a:tint val="73000"/>
+              </a:schemeClr>
+            </a:gs>
+            <a:gs pos="100000">
+              <a:schemeClr val="phClr">
+                <a:lumMod val="105000"/>
+                <a:satMod val="109000"/>
+                <a:tint val="81000"/>
+              </a:schemeClr>
+            </a:gs>
+          </a:gsLst>
+          <a:lin ang="5400000" scaled="0"/>
+        </a:gradFill>
+        <a:gradFill rotWithShape="1">
+          <a:gsLst>
+            <a:gs pos="0">
+              <a:schemeClr val="phClr">
+                <a:satMod val="103000"/>
+                <a:lumMod val="102000"/>
+                <a:tint val="94000"/>
+              </a:schemeClr>
+            </a:gs>
+            <a:gs pos="50000">
+              <a:schemeClr val="phClr">
+                <a:satMod val="110000"/>
+                <a:lumMod val="100000"/>
+                <a:shade val="100000"/>
+              </a:schemeClr>
+            </a:gs>
+            <a:gs pos="100000">
+              <a:schemeClr val="phClr">
+                <a:lumMod val="99000"/>
+                <a:satMod val="120000"/>
+                <a:shade val="78000"/>
+              </a:schemeClr>
+            </a:gs>
+          </a:gsLst>
+          <a:lin ang="5400000" scaled="0"/>
+        </a:gradFill>
+      </a:fillStyleLst>
+      <a:lnStyleLst>
+        <a:ln w="12700" cap="flat" cmpd="sng" algn="ctr">
+          <a:solidFill>
+            <a:schemeClr val="phClr"/>
+          </a:solidFill>
+          <a:prstDash val="solid"/>
+          <a:miter lim="800000"/>
+        </a:ln>
+        <a:ln w="19050" cap="flat" cmpd="sng" algn="ctr">
+          <a:solidFill>
+            <a:schemeClr val="phClr"/>
+          </a:solidFill>
+          <a:prstDash val="solid"/>
+          <a:miter lim="800000"/>
+        </a:ln>
+        <a:ln w="25400" cap="flat" cmpd="sng" algn="ctr">
+          <a:solidFill>
+            <a:schemeClr val="phClr"/>
+          </a:solidFill>
+          <a:prstDash val="solid"/>
+          <a:miter lim="800000"/>
+        </a:ln>
+      </a:lnStyleLst>
+      <a:effectStyleLst>
+        <a:effectStyle>
+          <a:effectLst/>
+        </a:effectStyle>
+        <a:effectStyle>
+          <a:effectLst/>
+        </a:effectStyle>
+        <a:effectStyle>
+          <a:effectLst>
+            <a:outerShdw blurRad="57150" dist="19050" dir="5400000" algn="ctr" rotWithShape="0">
+              <a:srgbClr val="000000">
+                <a:alpha val="63000"/>
+              </a:srgbClr>
+            </a:outerShdw>
+          </a:effectLst>
+        </a:effectStyle>
+      </a:effectStyleLst>
+      <a:bgFillStyleLst>
+        <a:solidFill>
+          <a:schemeClr val="phClr"/>
+        </a:solidFill>
+        <a:solidFill>
+          <a:schemeClr val="phClr">
+            <a:tint val="95000"/>
+            <a:satMod val="170000"/>
+          </a:schemeClr>
+        </a:solidFill>
+        <a:gradFill rotWithShape="1">
+          <a:gsLst>
+            <a:gs pos="0">
+              <a:schemeClr val="phClr">
+                <a:tint val="93000"/>
+                <a:satMod val="150000"/>
+                <a:shade val="98000"/>
+                <a:lumMod val="102000"/>
+              </a:schemeClr>
+            </a:gs>
+            <a:gs pos="50000">
+              <a:schemeClr val="phClr">
+                <a:tint val="98000"/>
+                <a:satMod val="130000"/>
+                <a:shade val="90000"/>
+                <a:lumMod val="103000"/>
+              </a:schemeClr>
+            </a:gs>
+            <a:gs pos="100000">
+              <a:schemeClr val="phClr">
+                <a:shade val="63000"/>
+                <a:satMod val="120000"/>
+              </a:schemeClr>
+            </a:gs>
+          </a:gsLst>
+          <a:lin ang="5400000" scaled="0"/>
+        </a:gradFill>
+      </a:bgFillStyleLst>
+    </a:fmtScheme>
+  </a:themeElements>
+  <a:objectDefaults>
+    <a:lnDef>
+      <a:spPr/>
+      <a:bodyPr/>
+      <a:lstStyle/>
+      <a:style>
+        <a:lnRef idx="2">
+          <a:schemeClr val="accent1"/>
+        </a:lnRef>
+        <a:fillRef idx="0">
+          <a:schemeClr val="accent1"/>
+        </a:fillRef>
+        <a:effectRef idx="1">
+          <a:schemeClr val="accent1"/>
+        </a:effectRef>
+        <a:fontRef idx="minor">
+          <a:schemeClr val="tx1"/>
+        </a:fontRef>
+      </a:style>
+    </a:lnDef>
+  </a:objectDefaults>
+  <a:extraClrSchemeLst/>
+  <a:extLst>
+    <a:ext uri="{05A4C25C-085E-4340-85A3-A5531E510DB2}">
+      <thm15:themeFamily xmlns:thm15="http://schemas.microsoft.com/office/thememl/2012/main" name="Office Theme" id="{2E142A2C-CD16-42D6-873A-C26D2A0506FA}" vid="{1BDDFF52-6CD6-40A5-AB3C-68EB2F1E4D0A}"/>
+    </a:ext>
+  </a:extLst>
+</a:theme>
 </file>
</xml_diff>